<commit_message>
Updated proposal and figure
</commit_message>
<xml_diff>
--- a/img/discrimination-model.pptx
+++ b/img/discrimination-model.pptx
@@ -8,8 +8,9 @@
     <p:sldId id="256" r:id="rId2"/>
     <p:sldId id="257" r:id="rId3"/>
     <p:sldId id="260" r:id="rId4"/>
-    <p:sldId id="259" r:id="rId5"/>
-    <p:sldId id="258" r:id="rId6"/>
+    <p:sldId id="261" r:id="rId5"/>
+    <p:sldId id="259" r:id="rId6"/>
+    <p:sldId id="258" r:id="rId7"/>
   </p:sldIdLst>
   <p:sldSz cx="12192000" cy="6858000"/>
   <p:notesSz cx="6858000" cy="9144000"/>
@@ -5725,7 +5726,7 @@
           <a:p>
             <a:fld id="{59E62B65-289D-A34B-978F-F8742FF11114}" type="datetimeFigureOut">
               <a:rPr lang="en-US" smtClean="0"/>
-              <a:t>6/10/19</a:t>
+              <a:t>6/29/19</a:t>
             </a:fld>
             <a:endParaRPr lang="en-US"/>
           </a:p>
@@ -5923,7 +5924,7 @@
           <a:p>
             <a:fld id="{59E62B65-289D-A34B-978F-F8742FF11114}" type="datetimeFigureOut">
               <a:rPr lang="en-US" smtClean="0"/>
-              <a:t>6/10/19</a:t>
+              <a:t>6/29/19</a:t>
             </a:fld>
             <a:endParaRPr lang="en-US"/>
           </a:p>
@@ -6131,7 +6132,7 @@
           <a:p>
             <a:fld id="{59E62B65-289D-A34B-978F-F8742FF11114}" type="datetimeFigureOut">
               <a:rPr lang="en-US" smtClean="0"/>
-              <a:t>6/10/19</a:t>
+              <a:t>6/29/19</a:t>
             </a:fld>
             <a:endParaRPr lang="en-US"/>
           </a:p>
@@ -6329,7 +6330,7 @@
           <a:p>
             <a:fld id="{59E62B65-289D-A34B-978F-F8742FF11114}" type="datetimeFigureOut">
               <a:rPr lang="en-US" smtClean="0"/>
-              <a:t>6/10/19</a:t>
+              <a:t>6/29/19</a:t>
             </a:fld>
             <a:endParaRPr lang="en-US"/>
           </a:p>
@@ -6604,7 +6605,7 @@
           <a:p>
             <a:fld id="{59E62B65-289D-A34B-978F-F8742FF11114}" type="datetimeFigureOut">
               <a:rPr lang="en-US" smtClean="0"/>
-              <a:t>6/10/19</a:t>
+              <a:t>6/29/19</a:t>
             </a:fld>
             <a:endParaRPr lang="en-US"/>
           </a:p>
@@ -6869,7 +6870,7 @@
           <a:p>
             <a:fld id="{59E62B65-289D-A34B-978F-F8742FF11114}" type="datetimeFigureOut">
               <a:rPr lang="en-US" smtClean="0"/>
-              <a:t>6/10/19</a:t>
+              <a:t>6/29/19</a:t>
             </a:fld>
             <a:endParaRPr lang="en-US"/>
           </a:p>
@@ -7281,7 +7282,7 @@
           <a:p>
             <a:fld id="{59E62B65-289D-A34B-978F-F8742FF11114}" type="datetimeFigureOut">
               <a:rPr lang="en-US" smtClean="0"/>
-              <a:t>6/10/19</a:t>
+              <a:t>6/29/19</a:t>
             </a:fld>
             <a:endParaRPr lang="en-US"/>
           </a:p>
@@ -7422,7 +7423,7 @@
           <a:p>
             <a:fld id="{59E62B65-289D-A34B-978F-F8742FF11114}" type="datetimeFigureOut">
               <a:rPr lang="en-US" smtClean="0"/>
-              <a:t>6/10/19</a:t>
+              <a:t>6/29/19</a:t>
             </a:fld>
             <a:endParaRPr lang="en-US"/>
           </a:p>
@@ -7535,7 +7536,7 @@
           <a:p>
             <a:fld id="{59E62B65-289D-A34B-978F-F8742FF11114}" type="datetimeFigureOut">
               <a:rPr lang="en-US" smtClean="0"/>
-              <a:t>6/10/19</a:t>
+              <a:t>6/29/19</a:t>
             </a:fld>
             <a:endParaRPr lang="en-US"/>
           </a:p>
@@ -7846,7 +7847,7 @@
           <a:p>
             <a:fld id="{59E62B65-289D-A34B-978F-F8742FF11114}" type="datetimeFigureOut">
               <a:rPr lang="en-US" smtClean="0"/>
-              <a:t>6/10/19</a:t>
+              <a:t>6/29/19</a:t>
             </a:fld>
             <a:endParaRPr lang="en-US"/>
           </a:p>
@@ -8134,7 +8135,7 @@
           <a:p>
             <a:fld id="{59E62B65-289D-A34B-978F-F8742FF11114}" type="datetimeFigureOut">
               <a:rPr lang="en-US" smtClean="0"/>
-              <a:t>6/10/19</a:t>
+              <a:t>6/29/19</a:t>
             </a:fld>
             <a:endParaRPr lang="en-US"/>
           </a:p>
@@ -8375,7 +8376,7 @@
           <a:p>
             <a:fld id="{59E62B65-289D-A34B-978F-F8742FF11114}" type="datetimeFigureOut">
               <a:rPr lang="en-US" smtClean="0"/>
-              <a:t>6/10/19</a:t>
+              <a:t>6/29/19</a:t>
             </a:fld>
             <a:endParaRPr lang="en-US"/>
           </a:p>
@@ -12422,6 +12423,1916 @@
       </p:grpSpPr>
       <p:sp>
         <p:nvSpPr>
+          <p:cNvPr id="348" name="Rounded Rectangle 347">
+            <a:extLst>
+              <a:ext uri="{FF2B5EF4-FFF2-40B4-BE49-F238E27FC236}">
+                <a16:creationId xmlns:a16="http://schemas.microsoft.com/office/drawing/2014/main" id="{F80678C9-BB6A-9A40-B360-B3C45B12D60C}"/>
+              </a:ext>
+            </a:extLst>
+          </p:cNvPr>
+          <p:cNvSpPr/>
+          <p:nvPr/>
+        </p:nvSpPr>
+        <p:spPr>
+          <a:xfrm>
+            <a:off x="6367336" y="3329139"/>
+            <a:ext cx="1952889" cy="742078"/>
+          </a:xfrm>
+          <a:prstGeom prst="roundRect">
+            <a:avLst/>
+          </a:prstGeom>
+        </p:spPr>
+        <p:style>
+          <a:lnRef idx="2">
+            <a:schemeClr val="accent1">
+              <a:shade val="50000"/>
+            </a:schemeClr>
+          </a:lnRef>
+          <a:fillRef idx="1">
+            <a:schemeClr val="accent1"/>
+          </a:fillRef>
+          <a:effectRef idx="0">
+            <a:schemeClr val="accent1"/>
+          </a:effectRef>
+          <a:fontRef idx="minor">
+            <a:schemeClr val="lt1"/>
+          </a:fontRef>
+        </p:style>
+        <p:txBody>
+          <a:bodyPr rtlCol="0" anchor="ctr"/>
+          <a:lstStyle/>
+          <a:p>
+            <a:r>
+              <a:rPr lang="en-US" sz="1000" b="1" dirty="0"/>
+              <a:t>Short-term Distress:</a:t>
+            </a:r>
+          </a:p>
+          <a:p>
+            <a:endParaRPr lang="en-US" sz="1000" b="1" dirty="0"/>
+          </a:p>
+          <a:p>
+            <a:endParaRPr lang="en-US" sz="1000" b="1" dirty="0"/>
+          </a:p>
+          <a:p>
+            <a:r>
+              <a:rPr lang="en-US" sz="1000" dirty="0"/>
+              <a:t>Self-reported measures</a:t>
+            </a:r>
+          </a:p>
+        </p:txBody>
+      </p:sp>
+      <p:cxnSp>
+        <p:nvCxnSpPr>
+          <p:cNvPr id="124" name="Curved Connector 123">
+            <a:extLst>
+              <a:ext uri="{FF2B5EF4-FFF2-40B4-BE49-F238E27FC236}">
+                <a16:creationId xmlns:a16="http://schemas.microsoft.com/office/drawing/2014/main" id="{DD964CFE-9C88-0444-B418-57BD9D88E3F6}"/>
+              </a:ext>
+            </a:extLst>
+          </p:cNvPr>
+          <p:cNvCxnSpPr>
+            <a:cxnSpLocks/>
+          </p:cNvCxnSpPr>
+          <p:nvPr/>
+        </p:nvCxnSpPr>
+        <p:spPr>
+          <a:xfrm rot="5400000">
+            <a:off x="5521771" y="3772319"/>
+            <a:ext cx="886360" cy="12700"/>
+          </a:xfrm>
+          <a:prstGeom prst="curvedConnector3">
+            <a:avLst>
+              <a:gd name="adj1" fmla="val 50000"/>
+            </a:avLst>
+          </a:prstGeom>
+          <a:ln w="19050">
+            <a:solidFill>
+              <a:srgbClr val="FFC000"/>
+            </a:solidFill>
+            <a:prstDash val="dash"/>
+            <a:tailEnd type="triangle"/>
+          </a:ln>
+        </p:spPr>
+        <p:style>
+          <a:lnRef idx="1">
+            <a:schemeClr val="accent1"/>
+          </a:lnRef>
+          <a:fillRef idx="0">
+            <a:schemeClr val="accent1"/>
+          </a:fillRef>
+          <a:effectRef idx="0">
+            <a:schemeClr val="accent1"/>
+          </a:effectRef>
+          <a:fontRef idx="minor">
+            <a:schemeClr val="tx1"/>
+          </a:fontRef>
+        </p:style>
+      </p:cxnSp>
+      <p:sp>
+        <p:nvSpPr>
+          <p:cNvPr id="23" name="TextBox 22">
+            <a:extLst>
+              <a:ext uri="{FF2B5EF4-FFF2-40B4-BE49-F238E27FC236}">
+                <a16:creationId xmlns:a16="http://schemas.microsoft.com/office/drawing/2014/main" id="{3EC02261-D41C-2849-B77C-8955B43AFB6E}"/>
+              </a:ext>
+            </a:extLst>
+          </p:cNvPr>
+          <p:cNvSpPr txBox="1"/>
+          <p:nvPr/>
+        </p:nvSpPr>
+        <p:spPr>
+          <a:xfrm>
+            <a:off x="4271326" y="3069325"/>
+            <a:ext cx="1863428" cy="246221"/>
+          </a:xfrm>
+          <a:prstGeom prst="rect">
+            <a:avLst/>
+          </a:prstGeom>
+          <a:noFill/>
+          <a:ln>
+            <a:solidFill>
+              <a:schemeClr val="accent1">
+                <a:shade val="50000"/>
+              </a:schemeClr>
+            </a:solidFill>
+            <a:prstDash val="dash"/>
+          </a:ln>
+        </p:spPr>
+        <p:txBody>
+          <a:bodyPr wrap="square" rtlCol="0">
+            <a:spAutoFit/>
+          </a:bodyPr>
+          <a:lstStyle/>
+          <a:p>
+            <a:r>
+              <a:rPr lang="en-US" sz="1000" dirty="0">
+                <a:solidFill>
+                  <a:schemeClr val="accent2">
+                    <a:lumMod val="75000"/>
+                  </a:schemeClr>
+                </a:solidFill>
+              </a:rPr>
+              <a:t>Impact stress reaction? (RQ10)</a:t>
+            </a:r>
+          </a:p>
+        </p:txBody>
+      </p:sp>
+      <p:sp>
+        <p:nvSpPr>
+          <p:cNvPr id="27" name="TextBox 26">
+            <a:extLst>
+              <a:ext uri="{FF2B5EF4-FFF2-40B4-BE49-F238E27FC236}">
+                <a16:creationId xmlns:a16="http://schemas.microsoft.com/office/drawing/2014/main" id="{09252181-301A-6943-B31D-692AE708DD3A}"/>
+              </a:ext>
+            </a:extLst>
+          </p:cNvPr>
+          <p:cNvSpPr txBox="1"/>
+          <p:nvPr/>
+        </p:nvSpPr>
+        <p:spPr>
+          <a:xfrm>
+            <a:off x="4510833" y="1812687"/>
+            <a:ext cx="1222323" cy="553998"/>
+          </a:xfrm>
+          <a:prstGeom prst="rect">
+            <a:avLst/>
+          </a:prstGeom>
+          <a:noFill/>
+        </p:spPr>
+        <p:txBody>
+          <a:bodyPr wrap="square" rtlCol="0">
+            <a:spAutoFit/>
+          </a:bodyPr>
+          <a:lstStyle/>
+          <a:p>
+            <a:r>
+              <a:rPr lang="en-US" sz="1000" dirty="0">
+                <a:solidFill>
+                  <a:schemeClr val="accent1"/>
+                </a:solidFill>
+              </a:rPr>
+              <a:t>Context </a:t>
+            </a:r>
+            <a:br>
+              <a:rPr lang="en-US" sz="1000" dirty="0">
+                <a:solidFill>
+                  <a:schemeClr val="accent1"/>
+                </a:solidFill>
+              </a:rPr>
+            </a:br>
+            <a:r>
+              <a:rPr lang="en-US" sz="1000" dirty="0">
+                <a:solidFill>
+                  <a:schemeClr val="accent1"/>
+                </a:solidFill>
+              </a:rPr>
+              <a:t>affects </a:t>
+            </a:r>
+            <a:br>
+              <a:rPr lang="en-US" sz="1000" dirty="0">
+                <a:solidFill>
+                  <a:schemeClr val="accent1"/>
+                </a:solidFill>
+              </a:rPr>
+            </a:br>
+            <a:r>
+              <a:rPr lang="en-US" sz="1000" dirty="0">
+                <a:solidFill>
+                  <a:schemeClr val="accent1"/>
+                </a:solidFill>
+              </a:rPr>
+              <a:t>resources</a:t>
+            </a:r>
+          </a:p>
+        </p:txBody>
+      </p:sp>
+      <p:sp>
+        <p:nvSpPr>
+          <p:cNvPr id="39" name="Rounded Rectangle 38">
+            <a:extLst>
+              <a:ext uri="{FF2B5EF4-FFF2-40B4-BE49-F238E27FC236}">
+                <a16:creationId xmlns:a16="http://schemas.microsoft.com/office/drawing/2014/main" id="{868D2CD3-058D-6649-8438-F315067A9855}"/>
+              </a:ext>
+            </a:extLst>
+          </p:cNvPr>
+          <p:cNvSpPr/>
+          <p:nvPr/>
+        </p:nvSpPr>
+        <p:spPr>
+          <a:xfrm>
+            <a:off x="4271326" y="2307154"/>
+            <a:ext cx="1863428" cy="724534"/>
+          </a:xfrm>
+          <a:prstGeom prst="roundRect">
+            <a:avLst/>
+          </a:prstGeom>
+        </p:spPr>
+        <p:style>
+          <a:lnRef idx="2">
+            <a:schemeClr val="accent1">
+              <a:shade val="50000"/>
+            </a:schemeClr>
+          </a:lnRef>
+          <a:fillRef idx="1">
+            <a:schemeClr val="accent1"/>
+          </a:fillRef>
+          <a:effectRef idx="0">
+            <a:schemeClr val="accent1"/>
+          </a:effectRef>
+          <a:fontRef idx="minor">
+            <a:schemeClr val="lt1"/>
+          </a:fontRef>
+        </p:style>
+        <p:txBody>
+          <a:bodyPr rtlCol="0" anchor="ctr"/>
+          <a:lstStyle/>
+          <a:p>
+            <a:endParaRPr lang="en-US" sz="1000" dirty="0"/>
+          </a:p>
+          <a:p>
+            <a:r>
+              <a:rPr lang="en-US" sz="1000" b="1" dirty="0"/>
+              <a:t>Resources (Internal)</a:t>
+            </a:r>
+            <a:br>
+              <a:rPr lang="en-US" sz="1000" dirty="0"/>
+            </a:br>
+            <a:r>
+              <a:rPr lang="en-US" sz="1000" dirty="0"/>
+              <a:t>Resilience</a:t>
+            </a:r>
+            <a:br>
+              <a:rPr lang="en-US" sz="1000" dirty="0"/>
+            </a:br>
+            <a:r>
+              <a:rPr lang="en-US" sz="1000" dirty="0"/>
+              <a:t>Social support</a:t>
+            </a:r>
+          </a:p>
+          <a:p>
+            <a:r>
+              <a:rPr lang="en-US" sz="1000" dirty="0"/>
+              <a:t>Physical health </a:t>
+            </a:r>
+            <a:br>
+              <a:rPr lang="en-US" sz="1000" dirty="0"/>
+            </a:br>
+            <a:r>
+              <a:rPr lang="en-US" sz="1000" dirty="0"/>
+              <a:t>…</a:t>
+            </a:r>
+          </a:p>
+        </p:txBody>
+      </p:sp>
+      <p:sp>
+        <p:nvSpPr>
+          <p:cNvPr id="44" name="Rounded Rectangle 43">
+            <a:extLst>
+              <a:ext uri="{FF2B5EF4-FFF2-40B4-BE49-F238E27FC236}">
+                <a16:creationId xmlns:a16="http://schemas.microsoft.com/office/drawing/2014/main" id="{6AA57306-3D0C-1542-B6AD-BF958D0C5BCE}"/>
+              </a:ext>
+            </a:extLst>
+          </p:cNvPr>
+          <p:cNvSpPr/>
+          <p:nvPr/>
+        </p:nvSpPr>
+        <p:spPr>
+          <a:xfrm>
+            <a:off x="2570781" y="3972643"/>
+            <a:ext cx="1639128" cy="1013791"/>
+          </a:xfrm>
+          <a:prstGeom prst="roundRect">
+            <a:avLst/>
+          </a:prstGeom>
+        </p:spPr>
+        <p:style>
+          <a:lnRef idx="2">
+            <a:schemeClr val="accent1">
+              <a:shade val="50000"/>
+            </a:schemeClr>
+          </a:lnRef>
+          <a:fillRef idx="1">
+            <a:schemeClr val="accent1"/>
+          </a:fillRef>
+          <a:effectRef idx="0">
+            <a:schemeClr val="accent1"/>
+          </a:effectRef>
+          <a:fontRef idx="minor">
+            <a:schemeClr val="lt1"/>
+          </a:fontRef>
+        </p:style>
+        <p:txBody>
+          <a:bodyPr rtlCol="0" anchor="ctr"/>
+          <a:lstStyle/>
+          <a:p>
+            <a:r>
+              <a:rPr lang="en-US" sz="1000" b="1" dirty="0"/>
+              <a:t>Daily Stressors (Unfair treatment):</a:t>
+            </a:r>
+            <a:br>
+              <a:rPr lang="en-US" sz="1000" dirty="0"/>
+            </a:br>
+            <a:r>
+              <a:rPr lang="en-US" sz="1000" dirty="0"/>
+              <a:t>Basis (race, gender, </a:t>
+            </a:r>
+            <a:r>
+              <a:rPr lang="en-US" sz="1000" i="1" dirty="0"/>
+              <a:t>etc.)</a:t>
+            </a:r>
+            <a:br>
+              <a:rPr lang="en-US" sz="1000" i="1" dirty="0"/>
+            </a:br>
+            <a:r>
+              <a:rPr lang="en-US" sz="1000" dirty="0"/>
+              <a:t>Source (peer, teacher,…)</a:t>
+            </a:r>
+          </a:p>
+          <a:p>
+            <a:r>
+              <a:rPr lang="en-US" sz="1000" dirty="0"/>
+              <a:t>Severity</a:t>
+            </a:r>
+          </a:p>
+        </p:txBody>
+      </p:sp>
+      <p:cxnSp>
+        <p:nvCxnSpPr>
+          <p:cNvPr id="66" name="Curved Connector 65">
+            <a:extLst>
+              <a:ext uri="{FF2B5EF4-FFF2-40B4-BE49-F238E27FC236}">
+                <a16:creationId xmlns:a16="http://schemas.microsoft.com/office/drawing/2014/main" id="{C641D7AA-BB57-014D-B60E-292D93D96B84}"/>
+              </a:ext>
+            </a:extLst>
+          </p:cNvPr>
+          <p:cNvCxnSpPr>
+            <a:cxnSpLocks/>
+          </p:cNvCxnSpPr>
+          <p:nvPr/>
+        </p:nvCxnSpPr>
+        <p:spPr>
+          <a:xfrm rot="5400000" flipH="1" flipV="1">
+            <a:off x="5968034" y="2563731"/>
+            <a:ext cx="1514921" cy="18706"/>
+          </a:xfrm>
+          <a:prstGeom prst="curvedConnector3">
+            <a:avLst>
+              <a:gd name="adj1" fmla="val 50000"/>
+            </a:avLst>
+          </a:prstGeom>
+          <a:ln w="19050">
+            <a:solidFill>
+              <a:srgbClr val="FFC000"/>
+            </a:solidFill>
+            <a:prstDash val="dash"/>
+            <a:tailEnd type="triangle"/>
+          </a:ln>
+        </p:spPr>
+        <p:style>
+          <a:lnRef idx="1">
+            <a:schemeClr val="accent1"/>
+          </a:lnRef>
+          <a:fillRef idx="0">
+            <a:schemeClr val="accent1"/>
+          </a:fillRef>
+          <a:effectRef idx="0">
+            <a:schemeClr val="accent1"/>
+          </a:effectRef>
+          <a:fontRef idx="minor">
+            <a:schemeClr val="tx1"/>
+          </a:fontRef>
+        </p:style>
+      </p:cxnSp>
+      <p:sp>
+        <p:nvSpPr>
+          <p:cNvPr id="72" name="TextBox 71">
+            <a:extLst>
+              <a:ext uri="{FF2B5EF4-FFF2-40B4-BE49-F238E27FC236}">
+                <a16:creationId xmlns:a16="http://schemas.microsoft.com/office/drawing/2014/main" id="{05B77780-5A3E-6A45-9B9E-8EB2515E644D}"/>
+              </a:ext>
+            </a:extLst>
+          </p:cNvPr>
+          <p:cNvSpPr txBox="1"/>
+          <p:nvPr/>
+        </p:nvSpPr>
+        <p:spPr>
+          <a:xfrm>
+            <a:off x="6782176" y="1860229"/>
+            <a:ext cx="1376266" cy="1169551"/>
+          </a:xfrm>
+          <a:prstGeom prst="rect">
+            <a:avLst/>
+          </a:prstGeom>
+          <a:noFill/>
+          <a:ln>
+            <a:solidFill>
+              <a:schemeClr val="accent1"/>
+            </a:solidFill>
+            <a:prstDash val="dash"/>
+          </a:ln>
+        </p:spPr>
+        <p:txBody>
+          <a:bodyPr wrap="square" rtlCol="0">
+            <a:spAutoFit/>
+          </a:bodyPr>
+          <a:lstStyle/>
+          <a:p>
+            <a:r>
+              <a:rPr lang="en-US" sz="1000" dirty="0">
+                <a:solidFill>
+                  <a:schemeClr val="accent2">
+                    <a:lumMod val="75000"/>
+                  </a:schemeClr>
+                </a:solidFill>
+              </a:rPr>
+              <a:t>Relationship of short term behavior to changes in long term outcomes (RQ4, RQ5); impact of resources &amp; cumulative adversity on this process (RQ6)</a:t>
+            </a:r>
+          </a:p>
+        </p:txBody>
+      </p:sp>
+      <p:cxnSp>
+        <p:nvCxnSpPr>
+          <p:cNvPr id="84" name="Curved Connector 83">
+            <a:extLst>
+              <a:ext uri="{FF2B5EF4-FFF2-40B4-BE49-F238E27FC236}">
+                <a16:creationId xmlns:a16="http://schemas.microsoft.com/office/drawing/2014/main" id="{82E3873B-07DB-FF4A-992A-6C6878D0C0E5}"/>
+              </a:ext>
+            </a:extLst>
+          </p:cNvPr>
+          <p:cNvCxnSpPr>
+            <a:cxnSpLocks/>
+            <a:endCxn id="39" idx="1"/>
+          </p:cNvCxnSpPr>
+          <p:nvPr/>
+        </p:nvCxnSpPr>
+        <p:spPr>
+          <a:xfrm>
+            <a:off x="2526389" y="2662513"/>
+            <a:ext cx="1744937" cy="6908"/>
+          </a:xfrm>
+          <a:prstGeom prst="curvedConnector3">
+            <a:avLst>
+              <a:gd name="adj1" fmla="val 50000"/>
+            </a:avLst>
+          </a:prstGeom>
+          <a:ln w="19050">
+            <a:solidFill>
+              <a:schemeClr val="accent1"/>
+            </a:solidFill>
+            <a:tailEnd type="triangle"/>
+          </a:ln>
+        </p:spPr>
+        <p:style>
+          <a:lnRef idx="1">
+            <a:schemeClr val="accent1"/>
+          </a:lnRef>
+          <a:fillRef idx="0">
+            <a:schemeClr val="accent1"/>
+          </a:fillRef>
+          <a:effectRef idx="0">
+            <a:schemeClr val="accent1"/>
+          </a:effectRef>
+          <a:fontRef idx="minor">
+            <a:schemeClr val="tx1"/>
+          </a:fontRef>
+        </p:style>
+      </p:cxnSp>
+      <p:sp>
+        <p:nvSpPr>
+          <p:cNvPr id="87" name="Rectangle 86">
+            <a:extLst>
+              <a:ext uri="{FF2B5EF4-FFF2-40B4-BE49-F238E27FC236}">
+                <a16:creationId xmlns:a16="http://schemas.microsoft.com/office/drawing/2014/main" id="{32E5AD0D-2D15-2045-9EA2-FF94400F2E4A}"/>
+              </a:ext>
+            </a:extLst>
+          </p:cNvPr>
+          <p:cNvSpPr/>
+          <p:nvPr/>
+        </p:nvSpPr>
+        <p:spPr>
+          <a:xfrm>
+            <a:off x="1092050" y="4448248"/>
+            <a:ext cx="2032208" cy="553998"/>
+          </a:xfrm>
+          <a:prstGeom prst="rect">
+            <a:avLst/>
+          </a:prstGeom>
+        </p:spPr>
+        <p:txBody>
+          <a:bodyPr wrap="square">
+            <a:spAutoFit/>
+          </a:bodyPr>
+          <a:lstStyle/>
+          <a:p>
+            <a:r>
+              <a:rPr lang="en-US" sz="1000" dirty="0">
+                <a:solidFill>
+                  <a:schemeClr val="accent1"/>
+                </a:solidFill>
+              </a:rPr>
+              <a:t>Socio-economic  </a:t>
+            </a:r>
+            <a:br>
+              <a:rPr lang="en-US" sz="1000" dirty="0">
+                <a:solidFill>
+                  <a:schemeClr val="accent1"/>
+                </a:solidFill>
+              </a:rPr>
+            </a:br>
+            <a:r>
+              <a:rPr lang="en-US" sz="1000" dirty="0">
+                <a:solidFill>
+                  <a:schemeClr val="accent1"/>
+                </a:solidFill>
+              </a:rPr>
+              <a:t>context affects likelihood </a:t>
+            </a:r>
+            <a:br>
+              <a:rPr lang="en-US" sz="1000" dirty="0">
+                <a:solidFill>
+                  <a:schemeClr val="accent1"/>
+                </a:solidFill>
+              </a:rPr>
+            </a:br>
+            <a:r>
+              <a:rPr lang="en-US" sz="1000" dirty="0">
+                <a:solidFill>
+                  <a:schemeClr val="accent1"/>
+                </a:solidFill>
+              </a:rPr>
+              <a:t>of discrimination </a:t>
+            </a:r>
+          </a:p>
+        </p:txBody>
+      </p:sp>
+      <p:cxnSp>
+        <p:nvCxnSpPr>
+          <p:cNvPr id="92" name="Straight Arrow Connector 91">
+            <a:extLst>
+              <a:ext uri="{FF2B5EF4-FFF2-40B4-BE49-F238E27FC236}">
+                <a16:creationId xmlns:a16="http://schemas.microsoft.com/office/drawing/2014/main" id="{B52D8403-6E01-4E44-9EC2-702F9494091B}"/>
+              </a:ext>
+            </a:extLst>
+          </p:cNvPr>
+          <p:cNvCxnSpPr>
+            <a:cxnSpLocks/>
+            <a:stCxn id="51" idx="3"/>
+          </p:cNvCxnSpPr>
+          <p:nvPr/>
+        </p:nvCxnSpPr>
+        <p:spPr>
+          <a:xfrm>
+            <a:off x="4209909" y="1570802"/>
+            <a:ext cx="2176133" cy="2792"/>
+          </a:xfrm>
+          <a:prstGeom prst="straightConnector1">
+            <a:avLst/>
+          </a:prstGeom>
+          <a:ln w="34925" cmpd="dbl">
+            <a:solidFill>
+              <a:schemeClr val="accent1"/>
+            </a:solidFill>
+            <a:tailEnd type="triangle"/>
+          </a:ln>
+        </p:spPr>
+        <p:style>
+          <a:lnRef idx="1">
+            <a:schemeClr val="accent1"/>
+          </a:lnRef>
+          <a:fillRef idx="0">
+            <a:schemeClr val="accent1"/>
+          </a:fillRef>
+          <a:effectRef idx="0">
+            <a:schemeClr val="accent1"/>
+          </a:effectRef>
+          <a:fontRef idx="minor">
+            <a:schemeClr val="tx1"/>
+          </a:fontRef>
+        </p:style>
+      </p:cxnSp>
+      <p:cxnSp>
+        <p:nvCxnSpPr>
+          <p:cNvPr id="96" name="Curved Connector 95">
+            <a:extLst>
+              <a:ext uri="{FF2B5EF4-FFF2-40B4-BE49-F238E27FC236}">
+                <a16:creationId xmlns:a16="http://schemas.microsoft.com/office/drawing/2014/main" id="{6A34EF9D-053A-6843-875B-502A62D7D0EE}"/>
+              </a:ext>
+            </a:extLst>
+          </p:cNvPr>
+          <p:cNvCxnSpPr>
+            <a:cxnSpLocks/>
+            <a:stCxn id="2" idx="1"/>
+            <a:endCxn id="44" idx="1"/>
+          </p:cNvCxnSpPr>
+          <p:nvPr/>
+        </p:nvCxnSpPr>
+        <p:spPr>
+          <a:xfrm rot="10800000" flipH="1" flipV="1">
+            <a:off x="860355" y="2884489"/>
+            <a:ext cx="1710426" cy="1595050"/>
+          </a:xfrm>
+          <a:prstGeom prst="curvedConnector3">
+            <a:avLst>
+              <a:gd name="adj1" fmla="val -13365"/>
+            </a:avLst>
+          </a:prstGeom>
+          <a:ln w="19050">
+            <a:solidFill>
+              <a:schemeClr val="accent1"/>
+            </a:solidFill>
+            <a:tailEnd type="triangle"/>
+          </a:ln>
+        </p:spPr>
+        <p:style>
+          <a:lnRef idx="1">
+            <a:schemeClr val="accent1"/>
+          </a:lnRef>
+          <a:fillRef idx="0">
+            <a:schemeClr val="accent1"/>
+          </a:fillRef>
+          <a:effectRef idx="0">
+            <a:schemeClr val="accent1"/>
+          </a:effectRef>
+          <a:fontRef idx="minor">
+            <a:schemeClr val="tx1"/>
+          </a:fontRef>
+        </p:style>
+      </p:cxnSp>
+      <p:sp>
+        <p:nvSpPr>
+          <p:cNvPr id="2" name="Rounded Rectangle 1">
+            <a:extLst>
+              <a:ext uri="{FF2B5EF4-FFF2-40B4-BE49-F238E27FC236}">
+                <a16:creationId xmlns:a16="http://schemas.microsoft.com/office/drawing/2014/main" id="{1B4824C6-8753-DA4C-A7EE-2598C7288547}"/>
+              </a:ext>
+            </a:extLst>
+          </p:cNvPr>
+          <p:cNvSpPr/>
+          <p:nvPr/>
+        </p:nvSpPr>
+        <p:spPr>
+          <a:xfrm>
+            <a:off x="860355" y="2401661"/>
+            <a:ext cx="1657075" cy="965655"/>
+          </a:xfrm>
+          <a:prstGeom prst="roundRect">
+            <a:avLst/>
+          </a:prstGeom>
+        </p:spPr>
+        <p:style>
+          <a:lnRef idx="2">
+            <a:schemeClr val="accent1">
+              <a:shade val="50000"/>
+            </a:schemeClr>
+          </a:lnRef>
+          <a:fillRef idx="1">
+            <a:schemeClr val="accent1"/>
+          </a:fillRef>
+          <a:effectRef idx="0">
+            <a:schemeClr val="accent1"/>
+          </a:effectRef>
+          <a:fontRef idx="minor">
+            <a:schemeClr val="lt1"/>
+          </a:fontRef>
+        </p:style>
+        <p:txBody>
+          <a:bodyPr rtlCol="0" anchor="ctr"/>
+          <a:lstStyle/>
+          <a:p>
+            <a:r>
+              <a:rPr lang="en-US" sz="1000" b="1" dirty="0"/>
+              <a:t>Social Characteristics:</a:t>
+            </a:r>
+            <a:br>
+              <a:rPr lang="en-US" sz="1000" dirty="0"/>
+            </a:br>
+            <a:r>
+              <a:rPr lang="en-US" sz="1000" dirty="0"/>
+              <a:t>Demographics</a:t>
+            </a:r>
+          </a:p>
+          <a:p>
+            <a:r>
+              <a:rPr lang="en-US" sz="1000" dirty="0"/>
+              <a:t>Socio-Economic Status</a:t>
+            </a:r>
+          </a:p>
+          <a:p>
+            <a:endParaRPr lang="en-US" sz="1000" dirty="0"/>
+          </a:p>
+          <a:p>
+            <a:endParaRPr lang="en-US" sz="1000" dirty="0"/>
+          </a:p>
+          <a:p>
+            <a:r>
+              <a:rPr lang="en-US" sz="1000" dirty="0"/>
+              <a:t> </a:t>
+            </a:r>
+          </a:p>
+        </p:txBody>
+      </p:sp>
+      <p:sp>
+        <p:nvSpPr>
+          <p:cNvPr id="110" name="Rounded Rectangle 109">
+            <a:extLst>
+              <a:ext uri="{FF2B5EF4-FFF2-40B4-BE49-F238E27FC236}">
+                <a16:creationId xmlns:a16="http://schemas.microsoft.com/office/drawing/2014/main" id="{47BBFDD2-936D-BF4E-8149-8B5BB93DD463}"/>
+              </a:ext>
+            </a:extLst>
+          </p:cNvPr>
+          <p:cNvSpPr/>
+          <p:nvPr/>
+        </p:nvSpPr>
+        <p:spPr>
+          <a:xfrm>
+            <a:off x="851396" y="2964781"/>
+            <a:ext cx="1666034" cy="406951"/>
+          </a:xfrm>
+          <a:prstGeom prst="roundRect">
+            <a:avLst/>
+          </a:prstGeom>
+          <a:solidFill>
+            <a:schemeClr val="accent4">
+              <a:lumMod val="40000"/>
+              <a:lumOff val="60000"/>
+            </a:schemeClr>
+          </a:solidFill>
+          <a:ln>
+            <a:prstDash val="dash"/>
+          </a:ln>
+        </p:spPr>
+        <p:style>
+          <a:lnRef idx="2">
+            <a:schemeClr val="accent1">
+              <a:shade val="50000"/>
+            </a:schemeClr>
+          </a:lnRef>
+          <a:fillRef idx="1">
+            <a:schemeClr val="accent1"/>
+          </a:fillRef>
+          <a:effectRef idx="0">
+            <a:schemeClr val="accent1"/>
+          </a:effectRef>
+          <a:fontRef idx="minor">
+            <a:schemeClr val="lt1"/>
+          </a:fontRef>
+        </p:style>
+        <p:txBody>
+          <a:bodyPr rtlCol="0" anchor="ctr"/>
+          <a:lstStyle/>
+          <a:p>
+            <a:r>
+              <a:rPr lang="en-US" sz="1000" b="1" dirty="0">
+                <a:solidFill>
+                  <a:schemeClr val="accent1"/>
+                </a:solidFill>
+              </a:rPr>
+              <a:t>Micro-climates:</a:t>
+            </a:r>
+            <a:r>
+              <a:rPr lang="en-US" sz="1000" dirty="0">
+                <a:solidFill>
+                  <a:schemeClr val="accent1"/>
+                </a:solidFill>
+              </a:rPr>
+              <a:t> STARS, Direct Admit, …)</a:t>
+            </a:r>
+          </a:p>
+        </p:txBody>
+      </p:sp>
+      <p:sp>
+        <p:nvSpPr>
+          <p:cNvPr id="113" name="TextBox 112">
+            <a:extLst>
+              <a:ext uri="{FF2B5EF4-FFF2-40B4-BE49-F238E27FC236}">
+                <a16:creationId xmlns:a16="http://schemas.microsoft.com/office/drawing/2014/main" id="{C4BB662B-88B2-3145-936E-AB40A073459D}"/>
+              </a:ext>
+            </a:extLst>
+          </p:cNvPr>
+          <p:cNvSpPr txBox="1"/>
+          <p:nvPr/>
+        </p:nvSpPr>
+        <p:spPr>
+          <a:xfrm>
+            <a:off x="4233918" y="3972643"/>
+            <a:ext cx="1639127" cy="553998"/>
+          </a:xfrm>
+          <a:prstGeom prst="rect">
+            <a:avLst/>
+          </a:prstGeom>
+          <a:noFill/>
+          <a:ln>
+            <a:solidFill>
+              <a:schemeClr val="accent1"/>
+            </a:solidFill>
+            <a:prstDash val="dash"/>
+          </a:ln>
+        </p:spPr>
+        <p:txBody>
+          <a:bodyPr wrap="square" rtlCol="0">
+            <a:spAutoFit/>
+          </a:bodyPr>
+          <a:lstStyle/>
+          <a:p>
+            <a:r>
+              <a:rPr lang="en-US" sz="1000" dirty="0">
+                <a:solidFill>
+                  <a:schemeClr val="accent2">
+                    <a:lumMod val="75000"/>
+                  </a:schemeClr>
+                </a:solidFill>
+              </a:rPr>
+              <a:t>Can we detect/ quantify impact via passive measures? (RQ1, RQ2, RQ3)</a:t>
+            </a:r>
+          </a:p>
+        </p:txBody>
+      </p:sp>
+      <p:sp>
+        <p:nvSpPr>
+          <p:cNvPr id="114" name="Rectangle 113">
+            <a:extLst>
+              <a:ext uri="{FF2B5EF4-FFF2-40B4-BE49-F238E27FC236}">
+                <a16:creationId xmlns:a16="http://schemas.microsoft.com/office/drawing/2014/main" id="{EF30DF17-2DB8-5A44-866D-BCA5D8990C59}"/>
+              </a:ext>
+            </a:extLst>
+          </p:cNvPr>
+          <p:cNvSpPr/>
+          <p:nvPr/>
+        </p:nvSpPr>
+        <p:spPr>
+          <a:xfrm>
+            <a:off x="2551564" y="2983143"/>
+            <a:ext cx="1564580" cy="400110"/>
+          </a:xfrm>
+          <a:prstGeom prst="rect">
+            <a:avLst/>
+          </a:prstGeom>
+          <a:ln>
+            <a:solidFill>
+              <a:schemeClr val="accent1"/>
+            </a:solidFill>
+            <a:prstDash val="dash"/>
+          </a:ln>
+        </p:spPr>
+        <p:txBody>
+          <a:bodyPr wrap="square">
+            <a:spAutoFit/>
+          </a:bodyPr>
+          <a:lstStyle/>
+          <a:p>
+            <a:r>
+              <a:rPr lang="en-US" sz="1000" dirty="0">
+                <a:solidFill>
+                  <a:schemeClr val="accent2">
+                    <a:lumMod val="75000"/>
+                  </a:schemeClr>
+                </a:solidFill>
+              </a:rPr>
+              <a:t>Impact available resources? (RQ8, RQ9)</a:t>
+            </a:r>
+          </a:p>
+        </p:txBody>
+      </p:sp>
+      <p:sp>
+        <p:nvSpPr>
+          <p:cNvPr id="118" name="Rounded Rectangle 117">
+            <a:extLst>
+              <a:ext uri="{FF2B5EF4-FFF2-40B4-BE49-F238E27FC236}">
+                <a16:creationId xmlns:a16="http://schemas.microsoft.com/office/drawing/2014/main" id="{E1CF6E8D-CE8C-C24E-9599-81C88133F80C}"/>
+              </a:ext>
+            </a:extLst>
+          </p:cNvPr>
+          <p:cNvSpPr/>
+          <p:nvPr/>
+        </p:nvSpPr>
+        <p:spPr>
+          <a:xfrm>
+            <a:off x="6367337" y="3618401"/>
+            <a:ext cx="1952889" cy="200054"/>
+          </a:xfrm>
+          <a:prstGeom prst="roundRect">
+            <a:avLst/>
+          </a:prstGeom>
+          <a:solidFill>
+            <a:schemeClr val="accent4">
+              <a:lumMod val="40000"/>
+              <a:lumOff val="60000"/>
+            </a:schemeClr>
+          </a:solidFill>
+          <a:ln>
+            <a:prstDash val="dash"/>
+          </a:ln>
+        </p:spPr>
+        <p:style>
+          <a:lnRef idx="2">
+            <a:schemeClr val="accent1">
+              <a:shade val="50000"/>
+            </a:schemeClr>
+          </a:lnRef>
+          <a:fillRef idx="1">
+            <a:schemeClr val="accent1"/>
+          </a:fillRef>
+          <a:effectRef idx="0">
+            <a:schemeClr val="accent1"/>
+          </a:effectRef>
+          <a:fontRef idx="minor">
+            <a:schemeClr val="lt1"/>
+          </a:fontRef>
+        </p:style>
+        <p:txBody>
+          <a:bodyPr rtlCol="0" anchor="ctr"/>
+          <a:lstStyle/>
+          <a:p>
+            <a:r>
+              <a:rPr lang="en-US" sz="1000" dirty="0">
+                <a:solidFill>
+                  <a:schemeClr val="accent1"/>
+                </a:solidFill>
+              </a:rPr>
+              <a:t>Passive measures </a:t>
+            </a:r>
+          </a:p>
+        </p:txBody>
+      </p:sp>
+      <p:sp>
+        <p:nvSpPr>
+          <p:cNvPr id="119" name="Rounded Rectangle 118">
+            <a:extLst>
+              <a:ext uri="{FF2B5EF4-FFF2-40B4-BE49-F238E27FC236}">
+                <a16:creationId xmlns:a16="http://schemas.microsoft.com/office/drawing/2014/main" id="{1C65FC42-CD68-5F4B-B610-C48A1D131283}"/>
+              </a:ext>
+            </a:extLst>
+          </p:cNvPr>
+          <p:cNvSpPr/>
+          <p:nvPr/>
+        </p:nvSpPr>
+        <p:spPr>
+          <a:xfrm>
+            <a:off x="6386042" y="891878"/>
+            <a:ext cx="1952889" cy="924883"/>
+          </a:xfrm>
+          <a:prstGeom prst="roundRect">
+            <a:avLst/>
+          </a:prstGeom>
+        </p:spPr>
+        <p:style>
+          <a:lnRef idx="2">
+            <a:schemeClr val="accent1">
+              <a:shade val="50000"/>
+            </a:schemeClr>
+          </a:lnRef>
+          <a:fillRef idx="1">
+            <a:schemeClr val="accent1"/>
+          </a:fillRef>
+          <a:effectRef idx="0">
+            <a:schemeClr val="accent1"/>
+          </a:effectRef>
+          <a:fontRef idx="minor">
+            <a:schemeClr val="lt1"/>
+          </a:fontRef>
+        </p:style>
+        <p:txBody>
+          <a:bodyPr rtlCol="0" anchor="ctr"/>
+          <a:lstStyle/>
+          <a:p>
+            <a:r>
+              <a:rPr lang="en-US" sz="1000" b="1" dirty="0"/>
+              <a:t>Long term outcomes: </a:t>
+            </a:r>
+          </a:p>
+          <a:p>
+            <a:endParaRPr lang="en-US" sz="1000" dirty="0"/>
+          </a:p>
+          <a:p>
+            <a:endParaRPr lang="en-US" sz="1000" dirty="0"/>
+          </a:p>
+          <a:p>
+            <a:r>
+              <a:rPr lang="en-US" sz="1000" dirty="0"/>
+              <a:t>Grades, retention, mental health, physical health</a:t>
+            </a:r>
+          </a:p>
+        </p:txBody>
+      </p:sp>
+      <p:sp>
+        <p:nvSpPr>
+          <p:cNvPr id="117" name="Rectangle 116">
+            <a:extLst>
+              <a:ext uri="{FF2B5EF4-FFF2-40B4-BE49-F238E27FC236}">
+                <a16:creationId xmlns:a16="http://schemas.microsoft.com/office/drawing/2014/main" id="{16DDDA5F-C3D8-654D-B658-BE113116683A}"/>
+              </a:ext>
+            </a:extLst>
+          </p:cNvPr>
+          <p:cNvSpPr/>
+          <p:nvPr/>
+        </p:nvSpPr>
+        <p:spPr>
+          <a:xfrm>
+            <a:off x="2551564" y="3404529"/>
+            <a:ext cx="1564580" cy="400110"/>
+          </a:xfrm>
+          <a:prstGeom prst="rect">
+            <a:avLst/>
+          </a:prstGeom>
+          <a:ln>
+            <a:solidFill>
+              <a:schemeClr val="accent1"/>
+            </a:solidFill>
+            <a:prstDash val="dash"/>
+          </a:ln>
+        </p:spPr>
+        <p:txBody>
+          <a:bodyPr wrap="square">
+            <a:spAutoFit/>
+          </a:bodyPr>
+          <a:lstStyle/>
+          <a:p>
+            <a:r>
+              <a:rPr lang="en-US" sz="1000" dirty="0">
+                <a:solidFill>
+                  <a:schemeClr val="accent2">
+                    <a:lumMod val="75000"/>
+                  </a:schemeClr>
+                </a:solidFill>
+              </a:rPr>
+              <a:t>Impact stress reaction? (RQ10)</a:t>
+            </a:r>
+          </a:p>
+        </p:txBody>
+      </p:sp>
+      <p:sp>
+        <p:nvSpPr>
+          <p:cNvPr id="133" name="TextBox 132">
+            <a:extLst>
+              <a:ext uri="{FF2B5EF4-FFF2-40B4-BE49-F238E27FC236}">
+                <a16:creationId xmlns:a16="http://schemas.microsoft.com/office/drawing/2014/main" id="{E3D880A1-E9C3-4D43-A574-2A7DBCCE6494}"/>
+              </a:ext>
+            </a:extLst>
+          </p:cNvPr>
+          <p:cNvSpPr txBox="1"/>
+          <p:nvPr/>
+        </p:nvSpPr>
+        <p:spPr>
+          <a:xfrm>
+            <a:off x="5599548" y="2260339"/>
+            <a:ext cx="300082" cy="369332"/>
+          </a:xfrm>
+          <a:prstGeom prst="rect">
+            <a:avLst/>
+          </a:prstGeom>
+          <a:noFill/>
+        </p:spPr>
+        <p:txBody>
+          <a:bodyPr wrap="none" rtlCol="0">
+            <a:spAutoFit/>
+          </a:bodyPr>
+          <a:lstStyle/>
+          <a:p>
+            <a:r>
+              <a:rPr lang="en-US" dirty="0">
+                <a:solidFill>
+                  <a:schemeClr val="accent1"/>
+                </a:solidFill>
+              </a:rPr>
+              <a:t>+</a:t>
+            </a:r>
+          </a:p>
+        </p:txBody>
+      </p:sp>
+      <p:cxnSp>
+        <p:nvCxnSpPr>
+          <p:cNvPr id="50" name="Curved Connector 49">
+            <a:extLst>
+              <a:ext uri="{FF2B5EF4-FFF2-40B4-BE49-F238E27FC236}">
+                <a16:creationId xmlns:a16="http://schemas.microsoft.com/office/drawing/2014/main" id="{44825DF9-C42B-8C40-B56E-D8E9650E1BE1}"/>
+              </a:ext>
+            </a:extLst>
+          </p:cNvPr>
+          <p:cNvCxnSpPr>
+            <a:cxnSpLocks/>
+            <a:stCxn id="39" idx="3"/>
+          </p:cNvCxnSpPr>
+          <p:nvPr/>
+        </p:nvCxnSpPr>
+        <p:spPr>
+          <a:xfrm flipV="1">
+            <a:off x="6134754" y="2662513"/>
+            <a:ext cx="581387" cy="6908"/>
+          </a:xfrm>
+          <a:prstGeom prst="curvedConnector3">
+            <a:avLst>
+              <a:gd name="adj1" fmla="val 50000"/>
+            </a:avLst>
+          </a:prstGeom>
+          <a:ln w="19050">
+            <a:solidFill>
+              <a:srgbClr val="FFC000"/>
+            </a:solidFill>
+            <a:prstDash val="dash"/>
+            <a:tailEnd type="triangle"/>
+          </a:ln>
+        </p:spPr>
+        <p:style>
+          <a:lnRef idx="1">
+            <a:schemeClr val="accent1"/>
+          </a:lnRef>
+          <a:fillRef idx="0">
+            <a:schemeClr val="accent1"/>
+          </a:fillRef>
+          <a:effectRef idx="0">
+            <a:schemeClr val="accent1"/>
+          </a:effectRef>
+          <a:fontRef idx="minor">
+            <a:schemeClr val="tx1"/>
+          </a:fontRef>
+        </p:style>
+      </p:cxnSp>
+      <p:sp>
+        <p:nvSpPr>
+          <p:cNvPr id="51" name="Rounded Rectangle 50">
+            <a:extLst>
+              <a:ext uri="{FF2B5EF4-FFF2-40B4-BE49-F238E27FC236}">
+                <a16:creationId xmlns:a16="http://schemas.microsoft.com/office/drawing/2014/main" id="{987FC765-C2DC-3F47-8EEC-A17CA0C46F29}"/>
+              </a:ext>
+            </a:extLst>
+          </p:cNvPr>
+          <p:cNvSpPr/>
+          <p:nvPr/>
+        </p:nvSpPr>
+        <p:spPr>
+          <a:xfrm>
+            <a:off x="2570781" y="1273039"/>
+            <a:ext cx="1639128" cy="595526"/>
+          </a:xfrm>
+          <a:prstGeom prst="roundRect">
+            <a:avLst/>
+          </a:prstGeom>
+        </p:spPr>
+        <p:style>
+          <a:lnRef idx="2">
+            <a:schemeClr val="accent1">
+              <a:shade val="50000"/>
+            </a:schemeClr>
+          </a:lnRef>
+          <a:fillRef idx="1">
+            <a:schemeClr val="accent1"/>
+          </a:fillRef>
+          <a:effectRef idx="0">
+            <a:schemeClr val="accent1"/>
+          </a:effectRef>
+          <a:fontRef idx="minor">
+            <a:schemeClr val="lt1"/>
+          </a:fontRef>
+        </p:style>
+        <p:txBody>
+          <a:bodyPr rtlCol="0" anchor="ctr"/>
+          <a:lstStyle/>
+          <a:p>
+            <a:r>
+              <a:rPr lang="en-US" sz="1000" b="1" dirty="0"/>
+              <a:t>Cumulative Adversity </a:t>
+            </a:r>
+            <a:r>
+              <a:rPr lang="en-US" sz="1000" dirty="0"/>
+              <a:t>Chronic Discrimination</a:t>
+            </a:r>
+          </a:p>
+          <a:p>
+            <a:r>
+              <a:rPr lang="en-US" sz="1000" dirty="0"/>
+              <a:t>Other Negative Events</a:t>
+            </a:r>
+          </a:p>
+        </p:txBody>
+      </p:sp>
+      <p:cxnSp>
+        <p:nvCxnSpPr>
+          <p:cNvPr id="76" name="Curved Connector 75">
+            <a:extLst>
+              <a:ext uri="{FF2B5EF4-FFF2-40B4-BE49-F238E27FC236}">
+                <a16:creationId xmlns:a16="http://schemas.microsoft.com/office/drawing/2014/main" id="{87ABA0DA-1DFA-CF4F-899B-01A605D344BA}"/>
+              </a:ext>
+            </a:extLst>
+          </p:cNvPr>
+          <p:cNvCxnSpPr>
+            <a:cxnSpLocks/>
+            <a:stCxn id="2" idx="0"/>
+            <a:endCxn id="51" idx="1"/>
+          </p:cNvCxnSpPr>
+          <p:nvPr/>
+        </p:nvCxnSpPr>
+        <p:spPr>
+          <a:xfrm rot="5400000" flipH="1" flipV="1">
+            <a:off x="1714408" y="1545288"/>
+            <a:ext cx="830859" cy="881888"/>
+          </a:xfrm>
+          <a:prstGeom prst="curvedConnector2">
+            <a:avLst/>
+          </a:prstGeom>
+          <a:ln w="19050">
+            <a:solidFill>
+              <a:schemeClr val="accent1"/>
+            </a:solidFill>
+            <a:tailEnd type="triangle"/>
+          </a:ln>
+        </p:spPr>
+        <p:style>
+          <a:lnRef idx="1">
+            <a:schemeClr val="accent1"/>
+          </a:lnRef>
+          <a:fillRef idx="0">
+            <a:schemeClr val="accent1"/>
+          </a:fillRef>
+          <a:effectRef idx="0">
+            <a:schemeClr val="accent1"/>
+          </a:effectRef>
+          <a:fontRef idx="minor">
+            <a:schemeClr val="tx1"/>
+          </a:fontRef>
+        </p:style>
+      </p:cxnSp>
+      <p:sp>
+        <p:nvSpPr>
+          <p:cNvPr id="79" name="Rectangle 78">
+            <a:extLst>
+              <a:ext uri="{FF2B5EF4-FFF2-40B4-BE49-F238E27FC236}">
+                <a16:creationId xmlns:a16="http://schemas.microsoft.com/office/drawing/2014/main" id="{8C95BB3C-E5A9-3449-AE0B-828C19B723D6}"/>
+              </a:ext>
+            </a:extLst>
+          </p:cNvPr>
+          <p:cNvSpPr/>
+          <p:nvPr/>
+        </p:nvSpPr>
+        <p:spPr>
+          <a:xfrm>
+            <a:off x="1092050" y="1362105"/>
+            <a:ext cx="1093458" cy="861774"/>
+          </a:xfrm>
+          <a:prstGeom prst="rect">
+            <a:avLst/>
+          </a:prstGeom>
+        </p:spPr>
+        <p:txBody>
+          <a:bodyPr wrap="square">
+            <a:spAutoFit/>
+          </a:bodyPr>
+          <a:lstStyle/>
+          <a:p>
+            <a:r>
+              <a:rPr lang="en-US" sz="1000" dirty="0">
+                <a:solidFill>
+                  <a:schemeClr val="accent1"/>
+                </a:solidFill>
+              </a:rPr>
+              <a:t>Socio-economic context affects likelihood of cumulative adversity</a:t>
+            </a:r>
+          </a:p>
+        </p:txBody>
+      </p:sp>
+      <p:cxnSp>
+        <p:nvCxnSpPr>
+          <p:cNvPr id="80" name="Curved Connector 79">
+            <a:extLst>
+              <a:ext uri="{FF2B5EF4-FFF2-40B4-BE49-F238E27FC236}">
+                <a16:creationId xmlns:a16="http://schemas.microsoft.com/office/drawing/2014/main" id="{D333C62C-B724-9B4D-8AFC-5F51FDE6CE4F}"/>
+              </a:ext>
+            </a:extLst>
+          </p:cNvPr>
+          <p:cNvCxnSpPr>
+            <a:cxnSpLocks/>
+            <a:stCxn id="51" idx="3"/>
+            <a:endCxn id="39" idx="0"/>
+          </p:cNvCxnSpPr>
+          <p:nvPr/>
+        </p:nvCxnSpPr>
+        <p:spPr>
+          <a:xfrm>
+            <a:off x="4209909" y="1570802"/>
+            <a:ext cx="993131" cy="736352"/>
+          </a:xfrm>
+          <a:prstGeom prst="curvedConnector2">
+            <a:avLst/>
+          </a:prstGeom>
+          <a:ln w="19050">
+            <a:solidFill>
+              <a:schemeClr val="accent1"/>
+            </a:solidFill>
+            <a:tailEnd type="triangle"/>
+          </a:ln>
+        </p:spPr>
+        <p:style>
+          <a:lnRef idx="1">
+            <a:schemeClr val="accent1"/>
+          </a:lnRef>
+          <a:fillRef idx="0">
+            <a:schemeClr val="accent1"/>
+          </a:fillRef>
+          <a:effectRef idx="0">
+            <a:schemeClr val="accent1"/>
+          </a:effectRef>
+          <a:fontRef idx="minor">
+            <a:schemeClr val="tx1"/>
+          </a:fontRef>
+        </p:style>
+      </p:cxnSp>
+      <p:sp>
+        <p:nvSpPr>
+          <p:cNvPr id="104" name="Rectangle 103">
+            <a:extLst>
+              <a:ext uri="{FF2B5EF4-FFF2-40B4-BE49-F238E27FC236}">
+                <a16:creationId xmlns:a16="http://schemas.microsoft.com/office/drawing/2014/main" id="{9B3E1E5A-2F20-0144-B264-4DD10190315F}"/>
+              </a:ext>
+            </a:extLst>
+          </p:cNvPr>
+          <p:cNvSpPr/>
+          <p:nvPr/>
+        </p:nvSpPr>
+        <p:spPr>
+          <a:xfrm>
+            <a:off x="867783" y="3407196"/>
+            <a:ext cx="1649648" cy="400110"/>
+          </a:xfrm>
+          <a:prstGeom prst="rect">
+            <a:avLst/>
+          </a:prstGeom>
+          <a:ln>
+            <a:solidFill>
+              <a:schemeClr val="accent1"/>
+            </a:solidFill>
+            <a:prstDash val="dash"/>
+          </a:ln>
+        </p:spPr>
+        <p:txBody>
+          <a:bodyPr wrap="square">
+            <a:spAutoFit/>
+          </a:bodyPr>
+          <a:lstStyle/>
+          <a:p>
+            <a:r>
+              <a:rPr lang="en-US" sz="1000" dirty="0">
+                <a:solidFill>
+                  <a:schemeClr val="accent2">
+                    <a:lumMod val="75000"/>
+                  </a:schemeClr>
+                </a:solidFill>
+              </a:rPr>
+              <a:t>Impact likelihood of discrimination? (RQ7)</a:t>
+            </a:r>
+          </a:p>
+        </p:txBody>
+      </p:sp>
+      <p:cxnSp>
+        <p:nvCxnSpPr>
+          <p:cNvPr id="105" name="Curved Connector 104">
+            <a:extLst>
+              <a:ext uri="{FF2B5EF4-FFF2-40B4-BE49-F238E27FC236}">
+                <a16:creationId xmlns:a16="http://schemas.microsoft.com/office/drawing/2014/main" id="{D003B05F-9AED-6142-93DC-A61145ECF8B6}"/>
+              </a:ext>
+            </a:extLst>
+          </p:cNvPr>
+          <p:cNvCxnSpPr>
+            <a:cxnSpLocks/>
+            <a:stCxn id="104" idx="2"/>
+            <a:endCxn id="44" idx="1"/>
+          </p:cNvCxnSpPr>
+          <p:nvPr/>
+        </p:nvCxnSpPr>
+        <p:spPr>
+          <a:xfrm rot="16200000" flipH="1">
+            <a:off x="1795578" y="3704335"/>
+            <a:ext cx="672233" cy="878174"/>
+          </a:xfrm>
+          <a:prstGeom prst="curvedConnector2">
+            <a:avLst/>
+          </a:prstGeom>
+          <a:ln w="19050">
+            <a:solidFill>
+              <a:srgbClr val="FFC000"/>
+            </a:solidFill>
+            <a:prstDash val="dash"/>
+            <a:tailEnd type="triangle"/>
+          </a:ln>
+        </p:spPr>
+        <p:style>
+          <a:lnRef idx="1">
+            <a:schemeClr val="accent1"/>
+          </a:lnRef>
+          <a:fillRef idx="0">
+            <a:schemeClr val="accent1"/>
+          </a:fillRef>
+          <a:effectRef idx="0">
+            <a:schemeClr val="accent1"/>
+          </a:effectRef>
+          <a:fontRef idx="minor">
+            <a:schemeClr val="tx1"/>
+          </a:fontRef>
+        </p:style>
+      </p:cxnSp>
+      <p:cxnSp>
+        <p:nvCxnSpPr>
+          <p:cNvPr id="204" name="Curved Connector 203">
+            <a:extLst>
+              <a:ext uri="{FF2B5EF4-FFF2-40B4-BE49-F238E27FC236}">
+                <a16:creationId xmlns:a16="http://schemas.microsoft.com/office/drawing/2014/main" id="{1DABD9DF-B198-974F-A04E-420361AB351B}"/>
+              </a:ext>
+            </a:extLst>
+          </p:cNvPr>
+          <p:cNvCxnSpPr>
+            <a:cxnSpLocks/>
+            <a:stCxn id="114" idx="0"/>
+            <a:endCxn id="39" idx="1"/>
+          </p:cNvCxnSpPr>
+          <p:nvPr/>
+        </p:nvCxnSpPr>
+        <p:spPr>
+          <a:xfrm rot="5400000" flipH="1" flipV="1">
+            <a:off x="3645729" y="2357546"/>
+            <a:ext cx="313722" cy="937472"/>
+          </a:xfrm>
+          <a:prstGeom prst="curvedConnector2">
+            <a:avLst/>
+          </a:prstGeom>
+          <a:ln w="19050">
+            <a:solidFill>
+              <a:srgbClr val="FFC000"/>
+            </a:solidFill>
+            <a:prstDash val="dash"/>
+            <a:tailEnd type="triangle"/>
+          </a:ln>
+        </p:spPr>
+        <p:style>
+          <a:lnRef idx="1">
+            <a:schemeClr val="accent1"/>
+          </a:lnRef>
+          <a:fillRef idx="0">
+            <a:schemeClr val="accent1"/>
+          </a:fillRef>
+          <a:effectRef idx="0">
+            <a:schemeClr val="accent1"/>
+          </a:effectRef>
+          <a:fontRef idx="minor">
+            <a:schemeClr val="tx1"/>
+          </a:fontRef>
+        </p:style>
+      </p:cxnSp>
+      <p:cxnSp>
+        <p:nvCxnSpPr>
+          <p:cNvPr id="222" name="Curved Connector 221">
+            <a:extLst>
+              <a:ext uri="{FF2B5EF4-FFF2-40B4-BE49-F238E27FC236}">
+                <a16:creationId xmlns:a16="http://schemas.microsoft.com/office/drawing/2014/main" id="{555429AF-D8F2-D346-BC3E-891B22AD0C6A}"/>
+              </a:ext>
+            </a:extLst>
+          </p:cNvPr>
+          <p:cNvCxnSpPr>
+            <a:cxnSpLocks/>
+          </p:cNvCxnSpPr>
+          <p:nvPr/>
+        </p:nvCxnSpPr>
+        <p:spPr>
+          <a:xfrm>
+            <a:off x="4106908" y="3669883"/>
+            <a:ext cx="2269895" cy="12700"/>
+          </a:xfrm>
+          <a:prstGeom prst="curvedConnector3">
+            <a:avLst>
+              <a:gd name="adj1" fmla="val 50000"/>
+            </a:avLst>
+          </a:prstGeom>
+          <a:ln w="19050">
+            <a:solidFill>
+              <a:schemeClr val="accent4"/>
+            </a:solidFill>
+            <a:prstDash val="dash"/>
+            <a:tailEnd type="triangle"/>
+          </a:ln>
+        </p:spPr>
+        <p:style>
+          <a:lnRef idx="1">
+            <a:schemeClr val="accent1"/>
+          </a:lnRef>
+          <a:fillRef idx="0">
+            <a:schemeClr val="accent1"/>
+          </a:fillRef>
+          <a:effectRef idx="0">
+            <a:schemeClr val="accent1"/>
+          </a:effectRef>
+          <a:fontRef idx="minor">
+            <a:schemeClr val="tx1"/>
+          </a:fontRef>
+        </p:style>
+      </p:cxnSp>
+      <p:cxnSp>
+        <p:nvCxnSpPr>
+          <p:cNvPr id="266" name="Curved Connector 265">
+            <a:extLst>
+              <a:ext uri="{FF2B5EF4-FFF2-40B4-BE49-F238E27FC236}">
+                <a16:creationId xmlns:a16="http://schemas.microsoft.com/office/drawing/2014/main" id="{16227D84-2A7B-C349-ACB2-B420EC9402F6}"/>
+              </a:ext>
+            </a:extLst>
+          </p:cNvPr>
+          <p:cNvCxnSpPr>
+            <a:cxnSpLocks/>
+            <a:stCxn id="113" idx="3"/>
+            <a:endCxn id="118" idx="1"/>
+          </p:cNvCxnSpPr>
+          <p:nvPr/>
+        </p:nvCxnSpPr>
+        <p:spPr>
+          <a:xfrm flipV="1">
+            <a:off x="5873045" y="3718428"/>
+            <a:ext cx="494292" cy="531214"/>
+          </a:xfrm>
+          <a:prstGeom prst="curvedConnector3">
+            <a:avLst>
+              <a:gd name="adj1" fmla="val 50000"/>
+            </a:avLst>
+          </a:prstGeom>
+          <a:ln w="19050">
+            <a:solidFill>
+              <a:schemeClr val="accent4"/>
+            </a:solidFill>
+            <a:prstDash val="dash"/>
+            <a:tailEnd type="triangle"/>
+          </a:ln>
+        </p:spPr>
+        <p:style>
+          <a:lnRef idx="1">
+            <a:schemeClr val="accent1"/>
+          </a:lnRef>
+          <a:fillRef idx="0">
+            <a:schemeClr val="accent1"/>
+          </a:fillRef>
+          <a:effectRef idx="0">
+            <a:schemeClr val="accent1"/>
+          </a:effectRef>
+          <a:fontRef idx="minor">
+            <a:schemeClr val="tx1"/>
+          </a:fontRef>
+        </p:style>
+      </p:cxnSp>
+      <p:cxnSp>
+        <p:nvCxnSpPr>
+          <p:cNvPr id="309" name="Straight Arrow Connector 308">
+            <a:extLst>
+              <a:ext uri="{FF2B5EF4-FFF2-40B4-BE49-F238E27FC236}">
+                <a16:creationId xmlns:a16="http://schemas.microsoft.com/office/drawing/2014/main" id="{95D6AEBC-11F1-E448-B534-DD2985A27C4E}"/>
+              </a:ext>
+            </a:extLst>
+          </p:cNvPr>
+          <p:cNvCxnSpPr>
+            <a:cxnSpLocks/>
+            <a:stCxn id="39" idx="0"/>
+          </p:cNvCxnSpPr>
+          <p:nvPr/>
+        </p:nvCxnSpPr>
+        <p:spPr>
+          <a:xfrm flipH="1" flipV="1">
+            <a:off x="5201076" y="1570802"/>
+            <a:ext cx="1964" cy="736352"/>
+          </a:xfrm>
+          <a:prstGeom prst="straightConnector1">
+            <a:avLst/>
+          </a:prstGeom>
+          <a:ln w="34925" cmpd="dbl">
+            <a:solidFill>
+              <a:schemeClr val="accent1"/>
+            </a:solidFill>
+            <a:tailEnd type="triangle"/>
+          </a:ln>
+        </p:spPr>
+        <p:style>
+          <a:lnRef idx="1">
+            <a:schemeClr val="accent1"/>
+          </a:lnRef>
+          <a:fillRef idx="0">
+            <a:schemeClr val="accent1"/>
+          </a:fillRef>
+          <a:effectRef idx="0">
+            <a:schemeClr val="accent1"/>
+          </a:effectRef>
+          <a:fontRef idx="minor">
+            <a:schemeClr val="tx1"/>
+          </a:fontRef>
+        </p:style>
+      </p:cxnSp>
+      <p:sp>
+        <p:nvSpPr>
+          <p:cNvPr id="312" name="TextBox 311">
+            <a:extLst>
+              <a:ext uri="{FF2B5EF4-FFF2-40B4-BE49-F238E27FC236}">
+                <a16:creationId xmlns:a16="http://schemas.microsoft.com/office/drawing/2014/main" id="{7343FDF6-8EDB-BE4B-B488-76180A071B83}"/>
+              </a:ext>
+            </a:extLst>
+          </p:cNvPr>
+          <p:cNvSpPr txBox="1"/>
+          <p:nvPr/>
+        </p:nvSpPr>
+        <p:spPr>
+          <a:xfrm>
+            <a:off x="5165900" y="1928172"/>
+            <a:ext cx="1313242" cy="400110"/>
+          </a:xfrm>
+          <a:prstGeom prst="rect">
+            <a:avLst/>
+          </a:prstGeom>
+          <a:noFill/>
+        </p:spPr>
+        <p:txBody>
+          <a:bodyPr wrap="square" rtlCol="0">
+            <a:spAutoFit/>
+          </a:bodyPr>
+          <a:lstStyle/>
+          <a:p>
+            <a:r>
+              <a:rPr lang="en-US" sz="1000" dirty="0">
+                <a:solidFill>
+                  <a:schemeClr val="accent1"/>
+                </a:solidFill>
+              </a:rPr>
+              <a:t>Resources affect</a:t>
+            </a:r>
+          </a:p>
+          <a:p>
+            <a:r>
+              <a:rPr lang="en-US" sz="1000" dirty="0">
+                <a:solidFill>
+                  <a:schemeClr val="accent1"/>
+                </a:solidFill>
+              </a:rPr>
+              <a:t>long term outcomes</a:t>
+            </a:r>
+          </a:p>
+        </p:txBody>
+      </p:sp>
+      <p:sp>
+        <p:nvSpPr>
+          <p:cNvPr id="316" name="Rounded Rectangle 315">
+            <a:extLst>
+              <a:ext uri="{FF2B5EF4-FFF2-40B4-BE49-F238E27FC236}">
+                <a16:creationId xmlns:a16="http://schemas.microsoft.com/office/drawing/2014/main" id="{C2E42EEA-D9E0-4845-AC68-E344F89EF84F}"/>
+              </a:ext>
+            </a:extLst>
+          </p:cNvPr>
+          <p:cNvSpPr/>
+          <p:nvPr/>
+        </p:nvSpPr>
+        <p:spPr>
+          <a:xfrm>
+            <a:off x="6389435" y="1161998"/>
+            <a:ext cx="1952888" cy="243004"/>
+          </a:xfrm>
+          <a:prstGeom prst="roundRect">
+            <a:avLst/>
+          </a:prstGeom>
+          <a:solidFill>
+            <a:schemeClr val="accent4">
+              <a:lumMod val="40000"/>
+              <a:lumOff val="60000"/>
+            </a:schemeClr>
+          </a:solidFill>
+          <a:ln>
+            <a:prstDash val="dash"/>
+          </a:ln>
+        </p:spPr>
+        <p:style>
+          <a:lnRef idx="2">
+            <a:schemeClr val="accent1">
+              <a:shade val="50000"/>
+            </a:schemeClr>
+          </a:lnRef>
+          <a:fillRef idx="1">
+            <a:schemeClr val="accent1"/>
+          </a:fillRef>
+          <a:effectRef idx="0">
+            <a:schemeClr val="accent1"/>
+          </a:effectRef>
+          <a:fontRef idx="minor">
+            <a:schemeClr val="lt1"/>
+          </a:fontRef>
+        </p:style>
+        <p:txBody>
+          <a:bodyPr rtlCol="0" anchor="ctr"/>
+          <a:lstStyle/>
+          <a:p>
+            <a:r>
+              <a:rPr lang="en-US" sz="1000" dirty="0">
+                <a:solidFill>
+                  <a:schemeClr val="accent1"/>
+                </a:solidFill>
+              </a:rPr>
+              <a:t>Passive measures</a:t>
+            </a:r>
+            <a:endParaRPr lang="en-US" sz="1000" b="1" dirty="0">
+              <a:solidFill>
+                <a:schemeClr val="accent1"/>
+              </a:solidFill>
+            </a:endParaRPr>
+          </a:p>
+        </p:txBody>
+      </p:sp>
+      <p:cxnSp>
+        <p:nvCxnSpPr>
+          <p:cNvPr id="318" name="Curved Connector 317">
+            <a:extLst>
+              <a:ext uri="{FF2B5EF4-FFF2-40B4-BE49-F238E27FC236}">
+                <a16:creationId xmlns:a16="http://schemas.microsoft.com/office/drawing/2014/main" id="{DE226DB6-A30D-DB4B-898D-19D33A326D5C}"/>
+              </a:ext>
+            </a:extLst>
+          </p:cNvPr>
+          <p:cNvCxnSpPr>
+            <a:cxnSpLocks/>
+          </p:cNvCxnSpPr>
+          <p:nvPr/>
+        </p:nvCxnSpPr>
+        <p:spPr>
+          <a:xfrm>
+            <a:off x="4228682" y="1866642"/>
+            <a:ext cx="2478833" cy="3787"/>
+          </a:xfrm>
+          <a:prstGeom prst="curvedConnector3">
+            <a:avLst>
+              <a:gd name="adj1" fmla="val 50000"/>
+            </a:avLst>
+          </a:prstGeom>
+          <a:ln w="19050">
+            <a:solidFill>
+              <a:srgbClr val="FFC000"/>
+            </a:solidFill>
+            <a:prstDash val="dash"/>
+            <a:tailEnd type="triangle"/>
+          </a:ln>
+        </p:spPr>
+        <p:style>
+          <a:lnRef idx="1">
+            <a:schemeClr val="accent1"/>
+          </a:lnRef>
+          <a:fillRef idx="0">
+            <a:schemeClr val="accent1"/>
+          </a:fillRef>
+          <a:effectRef idx="0">
+            <a:schemeClr val="accent1"/>
+          </a:effectRef>
+          <a:fontRef idx="minor">
+            <a:schemeClr val="tx1"/>
+          </a:fontRef>
+        </p:style>
+      </p:cxnSp>
+      <p:cxnSp>
+        <p:nvCxnSpPr>
+          <p:cNvPr id="351" name="Curved Connector 350">
+            <a:extLst>
+              <a:ext uri="{FF2B5EF4-FFF2-40B4-BE49-F238E27FC236}">
+                <a16:creationId xmlns:a16="http://schemas.microsoft.com/office/drawing/2014/main" id="{227FF392-C16F-434D-B838-AF0A10E28217}"/>
+              </a:ext>
+            </a:extLst>
+          </p:cNvPr>
+          <p:cNvCxnSpPr>
+            <a:cxnSpLocks/>
+            <a:endCxn id="348" idx="2"/>
+          </p:cNvCxnSpPr>
+          <p:nvPr/>
+        </p:nvCxnSpPr>
+        <p:spPr>
+          <a:xfrm flipV="1">
+            <a:off x="4271326" y="4071217"/>
+            <a:ext cx="3072455" cy="556246"/>
+          </a:xfrm>
+          <a:prstGeom prst="curvedConnector2">
+            <a:avLst/>
+          </a:prstGeom>
+          <a:ln w="19050">
+            <a:solidFill>
+              <a:schemeClr val="accent1"/>
+            </a:solidFill>
+            <a:tailEnd type="triangle"/>
+          </a:ln>
+        </p:spPr>
+        <p:style>
+          <a:lnRef idx="1">
+            <a:schemeClr val="accent1"/>
+          </a:lnRef>
+          <a:fillRef idx="0">
+            <a:schemeClr val="accent1"/>
+          </a:fillRef>
+          <a:effectRef idx="0">
+            <a:schemeClr val="accent1"/>
+          </a:effectRef>
+          <a:fontRef idx="minor">
+            <a:schemeClr val="tx1"/>
+          </a:fontRef>
+        </p:style>
+      </p:cxnSp>
+      <p:sp>
+        <p:nvSpPr>
+          <p:cNvPr id="375" name="Rectangle 374">
+            <a:extLst>
+              <a:ext uri="{FF2B5EF4-FFF2-40B4-BE49-F238E27FC236}">
+                <a16:creationId xmlns:a16="http://schemas.microsoft.com/office/drawing/2014/main" id="{9B2924A6-34C6-0046-9CA2-E01471EEE803}"/>
+              </a:ext>
+            </a:extLst>
+          </p:cNvPr>
+          <p:cNvSpPr/>
+          <p:nvPr/>
+        </p:nvSpPr>
+        <p:spPr>
+          <a:xfrm>
+            <a:off x="4150673" y="4633209"/>
+            <a:ext cx="2182364" cy="246221"/>
+          </a:xfrm>
+          <a:prstGeom prst="rect">
+            <a:avLst/>
+          </a:prstGeom>
+        </p:spPr>
+        <p:txBody>
+          <a:bodyPr wrap="square">
+            <a:spAutoFit/>
+          </a:bodyPr>
+          <a:lstStyle/>
+          <a:p>
+            <a:r>
+              <a:rPr lang="en-US" sz="1000" dirty="0">
+                <a:solidFill>
+                  <a:schemeClr val="accent1"/>
+                </a:solidFill>
+              </a:rPr>
+              <a:t>Daily stressors cause a stress reaction</a:t>
+            </a:r>
+          </a:p>
+        </p:txBody>
+      </p:sp>
+    </p:spTree>
+    <p:extLst>
+      <p:ext uri="{BB962C8B-B14F-4D97-AF65-F5344CB8AC3E}">
+        <p14:creationId xmlns:p14="http://schemas.microsoft.com/office/powerpoint/2010/main" val="1958747592"/>
+      </p:ext>
+    </p:extLst>
+  </p:cSld>
+  <p:clrMapOvr>
+    <a:masterClrMapping/>
+  </p:clrMapOvr>
+</p:sld>
+</file>
+
+<file path=ppt/slides/slide5.xml><?xml version="1.0" encoding="utf-8"?>
+<p:sld xmlns:a="http://schemas.openxmlformats.org/drawingml/2006/main" xmlns:r="http://schemas.openxmlformats.org/officeDocument/2006/relationships" xmlns:p="http://schemas.openxmlformats.org/presentationml/2006/main">
+  <p:cSld>
+    <p:spTree>
+      <p:nvGrpSpPr>
+        <p:cNvPr id="1" name=""/>
+        <p:cNvGrpSpPr/>
+        <p:nvPr/>
+      </p:nvGrpSpPr>
+      <p:grpSpPr>
+        <a:xfrm>
+          <a:off x="0" y="0"/>
+          <a:ext cx="0" cy="0"/>
+          <a:chOff x="0" y="0"/>
+          <a:chExt cx="0" cy="0"/>
+        </a:xfrm>
+      </p:grpSpPr>
+      <p:sp>
+        <p:nvSpPr>
           <p:cNvPr id="39" name="Rounded Rectangle 38">
             <a:extLst>
               <a:ext uri="{FF2B5EF4-FFF2-40B4-BE49-F238E27FC236}">
@@ -13854,7 +15765,7 @@
 </p:sld>
 </file>
 
-<file path=ppt/slides/slide5.xml><?xml version="1.0" encoding="utf-8"?>
+<file path=ppt/slides/slide6.xml><?xml version="1.0" encoding="utf-8"?>
 <p:sld xmlns:a="http://schemas.openxmlformats.org/drawingml/2006/main" xmlns:r="http://schemas.openxmlformats.org/officeDocument/2006/relationships" xmlns:p="http://schemas.openxmlformats.org/presentationml/2006/main">
   <p:cSld>
     <p:spTree>

</xml_diff>